<commit_message>
[ADD] -  mappenstructuur document. informatie over hoe alles is ingedeeld. dit graag aanhouden.
</commit_message>
<xml_diff>
--- a/Documenten/BCLW_Presentatie_HOLOCAR.pptx
+++ b/Documenten/BCLW_Presentatie_HOLOCAR.pptx
@@ -30,18 +30,23 @@
   <p:notesSz cx="6858000" cy="9144000"/>
   <p:embeddedFontLst>
     <p:embeddedFont>
-      <p:font typeface="Titillium Web" panose="00000500000000000000" charset="0"/>
+      <p:font typeface="Titillium Web" panose="00000500000000000000" pitchFamily="2" charset="0"/>
       <p:regular r:id="rId20"/>
       <p:bold r:id="rId21"/>
       <p:italic r:id="rId22"/>
       <p:boldItalic r:id="rId23"/>
     </p:embeddedFont>
     <p:embeddedFont>
-      <p:font typeface="Titillium Web ExtraLight" panose="00000300000000000000" charset="0"/>
+      <p:font typeface="Titillium Web ExtraLight" panose="00000300000000000000" pitchFamily="2" charset="0"/>
       <p:regular r:id="rId24"/>
       <p:bold r:id="rId25"/>
       <p:italic r:id="rId26"/>
       <p:boldItalic r:id="rId27"/>
+    </p:embeddedFont>
+    <p:embeddedFont>
+      <p:font typeface="Titillium Web SemiBold" panose="00000700000000000000" pitchFamily="2" charset="0"/>
+      <p:bold r:id="rId28"/>
+      <p:boldItalic r:id="rId29"/>
     </p:embeddedFont>
   </p:embeddedFontLst>
   <p:defaultTextStyle>
@@ -284,9 +289,53 @@
 <file path=ppt/revisionInfo.xml><?xml version="1.0" encoding="utf-8"?>
 <p1510:revInfo xmlns:a="http://schemas.openxmlformats.org/drawingml/2006/main" xmlns:r="http://schemas.openxmlformats.org/officeDocument/2006/relationships" xmlns:p1510="http://schemas.microsoft.com/office/powerpoint/2015/10/main">
   <p1510:revLst>
-    <p1510:client id="{55B4DFD9-1077-4129-88EF-82121254996F}" v="2877" dt="2018-09-17T11:22:01.992"/>
+    <p1510:client id="{FC0F7049-3325-426A-9CCE-D227D355AE12}" v="12" dt="2018-09-20T12:36:37.283"/>
   </p1510:revLst>
 </p1510:revInfo>
+</file>
+
+<file path=ppt/changesInfos/changesInfo1.xml><?xml version="1.0" encoding="utf-8"?>
+<pc:chgInfo xmlns:a="http://schemas.openxmlformats.org/drawingml/2006/main" xmlns:r="http://schemas.openxmlformats.org/officeDocument/2006/relationships" xmlns:ac="http://schemas.microsoft.com/office/drawing/2013/main/command" xmlns:pc="http://schemas.microsoft.com/office/powerpoint/2013/main/command">
+  <pc:docChgLst>
+    <pc:chgData name="Wessel Poldervaart" userId="0ddc857c0a0b9718" providerId="LiveId" clId="{FC0F7049-3325-426A-9CCE-D227D355AE12}"/>
+    <pc:docChg chg="modSld">
+      <pc:chgData name="Wessel Poldervaart" userId="0ddc857c0a0b9718" providerId="LiveId" clId="{FC0F7049-3325-426A-9CCE-D227D355AE12}" dt="2018-09-20T12:36:37.283" v="11" actId="2711"/>
+      <pc:docMkLst>
+        <pc:docMk/>
+      </pc:docMkLst>
+      <pc:sldChg chg="modSp">
+        <pc:chgData name="Wessel Poldervaart" userId="0ddc857c0a0b9718" providerId="LiveId" clId="{FC0F7049-3325-426A-9CCE-D227D355AE12}" dt="2018-09-20T12:36:20.235" v="10" actId="2711"/>
+        <pc:sldMkLst>
+          <pc:docMk/>
+          <pc:sldMk cId="0" sldId="256"/>
+        </pc:sldMkLst>
+        <pc:spChg chg="mod">
+          <ac:chgData name="Wessel Poldervaart" userId="0ddc857c0a0b9718" providerId="LiveId" clId="{FC0F7049-3325-426A-9CCE-D227D355AE12}" dt="2018-09-20T12:36:20.235" v="10" actId="2711"/>
+          <ac:spMkLst>
+            <pc:docMk/>
+            <pc:sldMk cId="0" sldId="256"/>
+            <ac:spMk id="779" creationId="{00000000-0000-0000-0000-000000000000}"/>
+          </ac:spMkLst>
+        </pc:spChg>
+      </pc:sldChg>
+      <pc:sldChg chg="modSp">
+        <pc:chgData name="Wessel Poldervaart" userId="0ddc857c0a0b9718" providerId="LiveId" clId="{FC0F7049-3325-426A-9CCE-D227D355AE12}" dt="2018-09-20T12:36:37.283" v="11" actId="2711"/>
+        <pc:sldMkLst>
+          <pc:docMk/>
+          <pc:sldMk cId="0" sldId="260"/>
+        </pc:sldMkLst>
+        <pc:spChg chg="mod">
+          <ac:chgData name="Wessel Poldervaart" userId="0ddc857c0a0b9718" providerId="LiveId" clId="{FC0F7049-3325-426A-9CCE-D227D355AE12}" dt="2018-09-20T12:36:37.283" v="11" actId="2711"/>
+          <ac:spMkLst>
+            <pc:docMk/>
+            <pc:sldMk cId="0" sldId="260"/>
+            <ac:spMk id="807" creationId="{00000000-0000-0000-0000-000000000000}"/>
+          </ac:spMkLst>
+        </pc:spChg>
+      </pc:sldChg>
+    </pc:docChg>
+  </pc:docChgLst>
+</pc:chgInfo>
 </file>
 
 <file path=ppt/notesMasters/notesMaster1.xml><?xml version="1.0" encoding="utf-8"?>
@@ -17810,7 +17859,7 @@
             </a:pPr>
             <a:fld id="{00000000-1234-1234-1234-123412341234}" type="slidenum">
               <a:rPr lang="en"/>
-              <a:t>‹nr.›</a:t>
+              <a:t>‹#›</a:t>
             </a:fld>
             <a:endParaRPr/>
           </a:p>
@@ -19839,7 +19888,7 @@
             </a:pPr>
             <a:fld id="{00000000-1234-1234-1234-123412341234}" type="slidenum">
               <a:rPr lang="en"/>
-              <a:t>‹nr.›</a:t>
+              <a:t>‹#›</a:t>
             </a:fld>
             <a:endParaRPr/>
           </a:p>
@@ -28488,7 +28537,7 @@
             </a:pPr>
             <a:fld id="{00000000-1234-1234-1234-123412341234}" type="slidenum">
               <a:rPr lang="en"/>
-              <a:t>‹nr.›</a:t>
+              <a:t>‹#›</a:t>
             </a:fld>
             <a:endParaRPr/>
           </a:p>
@@ -29114,7 +29163,7 @@
             </a:pPr>
             <a:fld id="{00000000-1234-1234-1234-123412341234}" type="slidenum">
               <a:rPr lang="en"/>
-              <a:t>‹nr.›</a:t>
+              <a:t>‹#›</a:t>
             </a:fld>
             <a:endParaRPr/>
           </a:p>
@@ -29218,7 +29267,7 @@
             </a:pPr>
             <a:fld id="{00000000-1234-1234-1234-123412341234}" type="slidenum">
               <a:rPr lang="en"/>
-              <a:t>‹nr.›</a:t>
+              <a:t>‹#›</a:t>
             </a:fld>
             <a:endParaRPr/>
           </a:p>
@@ -29322,7 +29371,7 @@
             </a:pPr>
             <a:fld id="{00000000-1234-1234-1234-123412341234}" type="slidenum">
               <a:rPr lang="en"/>
-              <a:t>‹nr.›</a:t>
+              <a:t>‹#›</a:t>
             </a:fld>
             <a:endParaRPr/>
           </a:p>
@@ -37620,7 +37669,7 @@
             </a:pPr>
             <a:fld id="{00000000-1234-1234-1234-123412341234}" type="slidenum">
               <a:rPr lang="en"/>
-              <a:t>‹nr.›</a:t>
+              <a:t>‹#›</a:t>
             </a:fld>
             <a:endParaRPr/>
           </a:p>
@@ -46376,7 +46425,7 @@
             </a:pPr>
             <a:fld id="{00000000-1234-1234-1234-123412341234}" type="slidenum">
               <a:rPr lang="en"/>
-              <a:t>‹nr.›</a:t>
+              <a:t>‹#›</a:t>
             </a:fld>
             <a:endParaRPr/>
           </a:p>
@@ -47140,7 +47189,9 @@
               <a:t>HOLO</a:t>
             </a:r>
             <a:r>
-              <a:rPr lang="nl-NL" sz="6000" b="1" dirty="0"/>
+              <a:rPr lang="nl-NL" sz="6000" b="1" dirty="0">
+                <a:latin typeface="Titillium Web SemiBold" panose="00000700000000000000" pitchFamily="2" charset="0"/>
+              </a:rPr>
               <a:t>CAR</a:t>
             </a:r>
             <a:br>
@@ -58581,10 +58632,14 @@
               <a:t>HOLO</a:t>
             </a:r>
             <a:r>
-              <a:rPr lang="nl-NL" sz="13800" b="1" dirty="0"/>
+              <a:rPr lang="nl-NL" sz="13800" b="1" dirty="0">
+                <a:latin typeface="Titillium Web SemiBold" panose="00000700000000000000" pitchFamily="2" charset="0"/>
+              </a:rPr>
               <a:t>CAR</a:t>
             </a:r>
-            <a:endParaRPr sz="13800" dirty="0"/>
+            <a:endParaRPr sz="13800" b="1" dirty="0">
+              <a:latin typeface="Titillium Web SemiBold" panose="00000700000000000000" pitchFamily="2" charset="0"/>
+            </a:endParaRPr>
           </a:p>
         </p:txBody>
       </p:sp>

</xml_diff>